<commit_message>
Add structure for presentation
</commit_message>
<xml_diff>
--- a/docs/verteidigung/Verteidigung.pptx
+++ b/docs/verteidigung/Verteidigung.pptx
@@ -2,11 +2,19 @@
 <file path=ppt/presentation.xml><?xml version="1.0" encoding="utf-8"?>
 <p:presentation xmlns:a="http://schemas.openxmlformats.org/drawingml/2006/main" xmlns:r="http://schemas.openxmlformats.org/officeDocument/2006/relationships" xmlns:p="http://schemas.openxmlformats.org/presentationml/2006/main" saveSubsetFonts="1">
   <p:sldMasterIdLst>
-    <p:sldMasterId id="2147483660" r:id="rId1"/>
+    <p:sldMasterId id="2147483720" r:id="rId1"/>
   </p:sldMasterIdLst>
   <p:sldIdLst>
     <p:sldId id="256" r:id="rId2"/>
     <p:sldId id="257" r:id="rId3"/>
+    <p:sldId id="258" r:id="rId4"/>
+    <p:sldId id="259" r:id="rId5"/>
+    <p:sldId id="260" r:id="rId6"/>
+    <p:sldId id="261" r:id="rId7"/>
+    <p:sldId id="262" r:id="rId8"/>
+    <p:sldId id="263" r:id="rId9"/>
+    <p:sldId id="264" r:id="rId10"/>
+    <p:sldId id="265" r:id="rId11"/>
   </p:sldIdLst>
   <p:sldSz cx="12192000" cy="6858000"/>
   <p:notesSz cx="6858000" cy="9144000"/>
@@ -361,7 +369,7 @@
           <a:bodyPr/>
           <a:lstStyle/>
           <a:p>
-            <a:fld id="{209A490C-0BF1-4910-AEA8-1E4A24D4238C}" type="datetimeFigureOut">
+            <a:fld id="{BDC69D26-2189-4A5C-AF99-9B07F8E2AF36}" type="datetimeFigureOut">
               <a:rPr lang="de-DE" smtClean="0"/>
               <a:t>28.01.2018</a:t>
             </a:fld>
@@ -403,7 +411,7 @@
           <a:bodyPr/>
           <a:lstStyle/>
           <a:p>
-            <a:fld id="{B3A0EED8-17DC-4B52-B259-AD4CB9BE1B4F}" type="slidenum">
+            <a:fld id="{297EE791-5D67-423F-A450-B005FE0C9AAB}" type="slidenum">
               <a:rPr lang="de-DE" smtClean="0"/>
               <a:t>‹Nr.›</a:t>
             </a:fld>
@@ -466,7 +474,7 @@
     </p:spTree>
     <p:extLst>
       <p:ext uri="{BB962C8B-B14F-4D97-AF65-F5344CB8AC3E}">
-        <p14:creationId xmlns:p14="http://schemas.microsoft.com/office/powerpoint/2010/main" val="1105178812"/>
+        <p14:creationId xmlns:p14="http://schemas.microsoft.com/office/powerpoint/2010/main" val="4048219612"/>
       </p:ext>
     </p:extLst>
   </p:cSld>
@@ -583,7 +591,7 @@
           <a:bodyPr/>
           <a:lstStyle/>
           <a:p>
-            <a:fld id="{209A490C-0BF1-4910-AEA8-1E4A24D4238C}" type="datetimeFigureOut">
+            <a:fld id="{BDC69D26-2189-4A5C-AF99-9B07F8E2AF36}" type="datetimeFigureOut">
               <a:rPr lang="de-DE" smtClean="0"/>
               <a:t>28.01.2018</a:t>
             </a:fld>
@@ -625,7 +633,7 @@
           <a:bodyPr/>
           <a:lstStyle/>
           <a:p>
-            <a:fld id="{B3A0EED8-17DC-4B52-B259-AD4CB9BE1B4F}" type="slidenum">
+            <a:fld id="{297EE791-5D67-423F-A450-B005FE0C9AAB}" type="slidenum">
               <a:rPr lang="de-DE" smtClean="0"/>
               <a:t>‹Nr.›</a:t>
             </a:fld>
@@ -636,7 +644,7 @@
     </p:spTree>
     <p:extLst>
       <p:ext uri="{BB962C8B-B14F-4D97-AF65-F5344CB8AC3E}">
-        <p14:creationId xmlns:p14="http://schemas.microsoft.com/office/powerpoint/2010/main" val="3265879233"/>
+        <p14:creationId xmlns:p14="http://schemas.microsoft.com/office/powerpoint/2010/main" val="387450073"/>
       </p:ext>
     </p:extLst>
   </p:cSld>
@@ -860,7 +868,7 @@
           <a:bodyPr/>
           <a:lstStyle/>
           <a:p>
-            <a:fld id="{209A490C-0BF1-4910-AEA8-1E4A24D4238C}" type="datetimeFigureOut">
+            <a:fld id="{BDC69D26-2189-4A5C-AF99-9B07F8E2AF36}" type="datetimeFigureOut">
               <a:rPr lang="de-DE" smtClean="0"/>
               <a:t>28.01.2018</a:t>
             </a:fld>
@@ -907,7 +915,7 @@
           <a:bodyPr/>
           <a:lstStyle/>
           <a:p>
-            <a:fld id="{B3A0EED8-17DC-4B52-B259-AD4CB9BE1B4F}" type="slidenum">
+            <a:fld id="{297EE791-5D67-423F-A450-B005FE0C9AAB}" type="slidenum">
               <a:rPr lang="de-DE" smtClean="0"/>
               <a:t>‹Nr.›</a:t>
             </a:fld>
@@ -918,7 +926,7 @@
     </p:spTree>
     <p:extLst>
       <p:ext uri="{BB962C8B-B14F-4D97-AF65-F5344CB8AC3E}">
-        <p14:creationId xmlns:p14="http://schemas.microsoft.com/office/powerpoint/2010/main" val="2426324394"/>
+        <p14:creationId xmlns:p14="http://schemas.microsoft.com/office/powerpoint/2010/main" val="2625717363"/>
       </p:ext>
     </p:extLst>
   </p:cSld>
@@ -1040,7 +1048,7 @@
           <a:bodyPr/>
           <a:lstStyle/>
           <a:p>
-            <a:fld id="{209A490C-0BF1-4910-AEA8-1E4A24D4238C}" type="datetimeFigureOut">
+            <a:fld id="{BDC69D26-2189-4A5C-AF99-9B07F8E2AF36}" type="datetimeFigureOut">
               <a:rPr lang="de-DE" smtClean="0"/>
               <a:t>28.01.2018</a:t>
             </a:fld>
@@ -1082,7 +1090,7 @@
           <a:bodyPr/>
           <a:lstStyle/>
           <a:p>
-            <a:fld id="{B3A0EED8-17DC-4B52-B259-AD4CB9BE1B4F}" type="slidenum">
+            <a:fld id="{297EE791-5D67-423F-A450-B005FE0C9AAB}" type="slidenum">
               <a:rPr lang="de-DE" smtClean="0"/>
               <a:t>‹Nr.›</a:t>
             </a:fld>
@@ -1093,7 +1101,7 @@
     </p:spTree>
     <p:extLst>
       <p:ext uri="{BB962C8B-B14F-4D97-AF65-F5344CB8AC3E}">
-        <p14:creationId xmlns:p14="http://schemas.microsoft.com/office/powerpoint/2010/main" val="2796213912"/>
+        <p14:creationId xmlns:p14="http://schemas.microsoft.com/office/powerpoint/2010/main" val="2902947773"/>
       </p:ext>
     </p:extLst>
   </p:cSld>
@@ -1399,7 +1407,7 @@
           <a:bodyPr/>
           <a:lstStyle/>
           <a:p>
-            <a:fld id="{209A490C-0BF1-4910-AEA8-1E4A24D4238C}" type="datetimeFigureOut">
+            <a:fld id="{BDC69D26-2189-4A5C-AF99-9B07F8E2AF36}" type="datetimeFigureOut">
               <a:rPr lang="de-DE" smtClean="0"/>
               <a:t>28.01.2018</a:t>
             </a:fld>
@@ -1441,7 +1449,7 @@
           <a:bodyPr/>
           <a:lstStyle/>
           <a:p>
-            <a:fld id="{B3A0EED8-17DC-4B52-B259-AD4CB9BE1B4F}" type="slidenum">
+            <a:fld id="{297EE791-5D67-423F-A450-B005FE0C9AAB}" type="slidenum">
               <a:rPr lang="de-DE" smtClean="0"/>
               <a:t>‹Nr.›</a:t>
             </a:fld>
@@ -1452,7 +1460,7 @@
     </p:spTree>
     <p:extLst>
       <p:ext uri="{BB962C8B-B14F-4D97-AF65-F5344CB8AC3E}">
-        <p14:creationId xmlns:p14="http://schemas.microsoft.com/office/powerpoint/2010/main" val="3406890713"/>
+        <p14:creationId xmlns:p14="http://schemas.microsoft.com/office/powerpoint/2010/main" val="1048707000"/>
       </p:ext>
     </p:extLst>
   </p:cSld>
@@ -1689,7 +1697,7 @@
           <a:bodyPr/>
           <a:lstStyle/>
           <a:p>
-            <a:fld id="{209A490C-0BF1-4910-AEA8-1E4A24D4238C}" type="datetimeFigureOut">
+            <a:fld id="{BDC69D26-2189-4A5C-AF99-9B07F8E2AF36}" type="datetimeFigureOut">
               <a:rPr lang="de-DE" smtClean="0"/>
               <a:t>28.01.2018</a:t>
             </a:fld>
@@ -1731,7 +1739,7 @@
           <a:bodyPr/>
           <a:lstStyle/>
           <a:p>
-            <a:fld id="{B3A0EED8-17DC-4B52-B259-AD4CB9BE1B4F}" type="slidenum">
+            <a:fld id="{297EE791-5D67-423F-A450-B005FE0C9AAB}" type="slidenum">
               <a:rPr lang="de-DE" smtClean="0"/>
               <a:t>‹Nr.›</a:t>
             </a:fld>
@@ -1742,7 +1750,7 @@
     </p:spTree>
     <p:extLst>
       <p:ext uri="{BB962C8B-B14F-4D97-AF65-F5344CB8AC3E}">
-        <p14:creationId xmlns:p14="http://schemas.microsoft.com/office/powerpoint/2010/main" val="1798713757"/>
+        <p14:creationId xmlns:p14="http://schemas.microsoft.com/office/powerpoint/2010/main" val="2294688291"/>
       </p:ext>
     </p:extLst>
   </p:cSld>
@@ -2116,7 +2124,7 @@
           <a:bodyPr/>
           <a:lstStyle/>
           <a:p>
-            <a:fld id="{209A490C-0BF1-4910-AEA8-1E4A24D4238C}" type="datetimeFigureOut">
+            <a:fld id="{BDC69D26-2189-4A5C-AF99-9B07F8E2AF36}" type="datetimeFigureOut">
               <a:rPr lang="de-DE" smtClean="0"/>
               <a:t>28.01.2018</a:t>
             </a:fld>
@@ -2158,7 +2166,7 @@
           <a:bodyPr/>
           <a:lstStyle/>
           <a:p>
-            <a:fld id="{B3A0EED8-17DC-4B52-B259-AD4CB9BE1B4F}" type="slidenum">
+            <a:fld id="{297EE791-5D67-423F-A450-B005FE0C9AAB}" type="slidenum">
               <a:rPr lang="de-DE" smtClean="0"/>
               <a:t>‹Nr.›</a:t>
             </a:fld>
@@ -2169,7 +2177,7 @@
     </p:spTree>
     <p:extLst>
       <p:ext uri="{BB962C8B-B14F-4D97-AF65-F5344CB8AC3E}">
-        <p14:creationId xmlns:p14="http://schemas.microsoft.com/office/powerpoint/2010/main" val="575169011"/>
+        <p14:creationId xmlns:p14="http://schemas.microsoft.com/office/powerpoint/2010/main" val="1617216665"/>
       </p:ext>
     </p:extLst>
   </p:cSld>
@@ -2234,7 +2242,7 @@
           <a:bodyPr/>
           <a:lstStyle/>
           <a:p>
-            <a:fld id="{209A490C-0BF1-4910-AEA8-1E4A24D4238C}" type="datetimeFigureOut">
+            <a:fld id="{BDC69D26-2189-4A5C-AF99-9B07F8E2AF36}" type="datetimeFigureOut">
               <a:rPr lang="de-DE" smtClean="0"/>
               <a:t>28.01.2018</a:t>
             </a:fld>
@@ -2276,7 +2284,7 @@
           <a:bodyPr/>
           <a:lstStyle/>
           <a:p>
-            <a:fld id="{B3A0EED8-17DC-4B52-B259-AD4CB9BE1B4F}" type="slidenum">
+            <a:fld id="{297EE791-5D67-423F-A450-B005FE0C9AAB}" type="slidenum">
               <a:rPr lang="de-DE" smtClean="0"/>
               <a:t>‹Nr.›</a:t>
             </a:fld>
@@ -2287,7 +2295,7 @@
     </p:spTree>
     <p:extLst>
       <p:ext uri="{BB962C8B-B14F-4D97-AF65-F5344CB8AC3E}">
-        <p14:creationId xmlns:p14="http://schemas.microsoft.com/office/powerpoint/2010/main" val="3997771594"/>
+        <p14:creationId xmlns:p14="http://schemas.microsoft.com/office/powerpoint/2010/main" val="1567695929"/>
       </p:ext>
     </p:extLst>
   </p:cSld>
@@ -2329,7 +2337,7 @@
           <a:bodyPr/>
           <a:lstStyle/>
           <a:p>
-            <a:fld id="{209A490C-0BF1-4910-AEA8-1E4A24D4238C}" type="datetimeFigureOut">
+            <a:fld id="{BDC69D26-2189-4A5C-AF99-9B07F8E2AF36}" type="datetimeFigureOut">
               <a:rPr lang="de-DE" smtClean="0"/>
               <a:t>28.01.2018</a:t>
             </a:fld>
@@ -2371,7 +2379,7 @@
           <a:bodyPr/>
           <a:lstStyle/>
           <a:p>
-            <a:fld id="{B3A0EED8-17DC-4B52-B259-AD4CB9BE1B4F}" type="slidenum">
+            <a:fld id="{297EE791-5D67-423F-A450-B005FE0C9AAB}" type="slidenum">
               <a:rPr lang="de-DE" smtClean="0"/>
               <a:t>‹Nr.›</a:t>
             </a:fld>
@@ -2382,7 +2390,7 @@
     </p:spTree>
     <p:extLst>
       <p:ext uri="{BB962C8B-B14F-4D97-AF65-F5344CB8AC3E}">
-        <p14:creationId xmlns:p14="http://schemas.microsoft.com/office/powerpoint/2010/main" val="2237285202"/>
+        <p14:creationId xmlns:p14="http://schemas.microsoft.com/office/powerpoint/2010/main" val="3419900583"/>
       </p:ext>
     </p:extLst>
   </p:cSld>
@@ -2612,7 +2620,7 @@
           <a:bodyPr/>
           <a:lstStyle/>
           <a:p>
-            <a:fld id="{209A490C-0BF1-4910-AEA8-1E4A24D4238C}" type="datetimeFigureOut">
+            <a:fld id="{BDC69D26-2189-4A5C-AF99-9B07F8E2AF36}" type="datetimeFigureOut">
               <a:rPr lang="de-DE" smtClean="0"/>
               <a:t>28.01.2018</a:t>
             </a:fld>
@@ -2654,7 +2662,7 @@
           <a:bodyPr/>
           <a:lstStyle/>
           <a:p>
-            <a:fld id="{B3A0EED8-17DC-4B52-B259-AD4CB9BE1B4F}" type="slidenum">
+            <a:fld id="{297EE791-5D67-423F-A450-B005FE0C9AAB}" type="slidenum">
               <a:rPr lang="de-DE" smtClean="0"/>
               <a:t>‹Nr.›</a:t>
             </a:fld>
@@ -2755,7 +2763,7 @@
     </p:spTree>
     <p:extLst>
       <p:ext uri="{BB962C8B-B14F-4D97-AF65-F5344CB8AC3E}">
-        <p14:creationId xmlns:p14="http://schemas.microsoft.com/office/powerpoint/2010/main" val="226270411"/>
+        <p14:creationId xmlns:p14="http://schemas.microsoft.com/office/powerpoint/2010/main" val="3378217514"/>
       </p:ext>
     </p:extLst>
   </p:cSld>
@@ -2979,7 +2987,7 @@
           <a:bodyPr/>
           <a:lstStyle/>
           <a:p>
-            <a:fld id="{209A490C-0BF1-4910-AEA8-1E4A24D4238C}" type="datetimeFigureOut">
+            <a:fld id="{BDC69D26-2189-4A5C-AF99-9B07F8E2AF36}" type="datetimeFigureOut">
               <a:rPr lang="de-DE" smtClean="0"/>
               <a:t>28.01.2018</a:t>
             </a:fld>
@@ -3131,7 +3139,7 @@
           <a:bodyPr/>
           <a:lstStyle/>
           <a:p>
-            <a:fld id="{B3A0EED8-17DC-4B52-B259-AD4CB9BE1B4F}" type="slidenum">
+            <a:fld id="{297EE791-5D67-423F-A450-B005FE0C9AAB}" type="slidenum">
               <a:rPr lang="de-DE" smtClean="0"/>
               <a:t>‹Nr.›</a:t>
             </a:fld>
@@ -3142,7 +3150,7 @@
     </p:spTree>
     <p:extLst>
       <p:ext uri="{BB962C8B-B14F-4D97-AF65-F5344CB8AC3E}">
-        <p14:creationId xmlns:p14="http://schemas.microsoft.com/office/powerpoint/2010/main" val="238487298"/>
+        <p14:creationId xmlns:p14="http://schemas.microsoft.com/office/powerpoint/2010/main" val="300766204"/>
       </p:ext>
     </p:extLst>
   </p:cSld>
@@ -3409,7 +3417,7 @@
             <a:extLst/>
           </a:lstStyle>
           <a:p>
-            <a:fld id="{209A490C-0BF1-4910-AEA8-1E4A24D4238C}" type="datetimeFigureOut">
+            <a:fld id="{BDC69D26-2189-4A5C-AF99-9B07F8E2AF36}" type="datetimeFigureOut">
               <a:rPr lang="de-DE" smtClean="0"/>
               <a:t>28.01.2018</a:t>
             </a:fld>
@@ -3489,7 +3497,7 @@
             <a:extLst/>
           </a:lstStyle>
           <a:p>
-            <a:fld id="{B3A0EED8-17DC-4B52-B259-AD4CB9BE1B4F}" type="slidenum">
+            <a:fld id="{297EE791-5D67-423F-A450-B005FE0C9AAB}" type="slidenum">
               <a:rPr lang="de-DE" smtClean="0"/>
               <a:t>‹Nr.›</a:t>
             </a:fld>
@@ -3500,23 +3508,23 @@
     </p:spTree>
     <p:extLst>
       <p:ext uri="{BB962C8B-B14F-4D97-AF65-F5344CB8AC3E}">
-        <p14:creationId xmlns:p14="http://schemas.microsoft.com/office/powerpoint/2010/main" val="793235658"/>
+        <p14:creationId xmlns:p14="http://schemas.microsoft.com/office/powerpoint/2010/main" val="1531512721"/>
       </p:ext>
     </p:extLst>
   </p:cSld>
   <p:clrMap bg1="lt1" tx1="dk1" bg2="lt2" tx2="dk2" accent1="accent1" accent2="accent2" accent3="accent3" accent4="accent4" accent5="accent5" accent6="accent6" hlink="hlink" folHlink="folHlink"/>
   <p:sldLayoutIdLst>
-    <p:sldLayoutId id="2147483661" r:id="rId1"/>
-    <p:sldLayoutId id="2147483662" r:id="rId2"/>
-    <p:sldLayoutId id="2147483663" r:id="rId3"/>
-    <p:sldLayoutId id="2147483664" r:id="rId4"/>
-    <p:sldLayoutId id="2147483665" r:id="rId5"/>
-    <p:sldLayoutId id="2147483666" r:id="rId6"/>
-    <p:sldLayoutId id="2147483667" r:id="rId7"/>
-    <p:sldLayoutId id="2147483668" r:id="rId8"/>
-    <p:sldLayoutId id="2147483669" r:id="rId9"/>
-    <p:sldLayoutId id="2147483670" r:id="rId10"/>
-    <p:sldLayoutId id="2147483671" r:id="rId11"/>
+    <p:sldLayoutId id="2147483721" r:id="rId1"/>
+    <p:sldLayoutId id="2147483722" r:id="rId2"/>
+    <p:sldLayoutId id="2147483723" r:id="rId3"/>
+    <p:sldLayoutId id="2147483724" r:id="rId4"/>
+    <p:sldLayoutId id="2147483725" r:id="rId5"/>
+    <p:sldLayoutId id="2147483726" r:id="rId6"/>
+    <p:sldLayoutId id="2147483727" r:id="rId7"/>
+    <p:sldLayoutId id="2147483728" r:id="rId8"/>
+    <p:sldLayoutId id="2147483729" r:id="rId9"/>
+    <p:sldLayoutId id="2147483730" r:id="rId10"/>
+    <p:sldLayoutId id="2147483731" r:id="rId11"/>
   </p:sldLayoutIdLst>
   <p:txStyles>
     <p:titleStyle>
@@ -3840,24 +3848,18 @@
           <a:lstStyle/>
           <a:p>
             <a:r>
-              <a:rPr lang="de-DE" sz="3600" b="1" dirty="0">
+              <a:rPr lang="de-DE" sz="3200" b="1" dirty="0">
                 <a:effectLst/>
               </a:rPr>
-              <a:t>Merkmalserkennung von Gebäuden und Grundstücken in Satellitenbildern mittels </a:t>
-            </a:r>
-            <a:r>
-              <a:rPr lang="de-DE" sz="3600" b="1" dirty="0" err="1">
-                <a:effectLst/>
-              </a:rPr>
-              <a:t>Deeplearning</a:t>
-            </a:r>
-            <a:r>
-              <a:rPr lang="de-DE" sz="3600" dirty="0">
+              <a:t>Merkmalserkennung von Gebäuden und Grundstücken in Satellitenbildern mittels Deeplearning</a:t>
+            </a:r>
+            <a:r>
+              <a:rPr lang="de-DE" sz="3200" dirty="0">
                 <a:effectLst/>
               </a:rPr>
               <a:t> </a:t>
             </a:r>
-            <a:endParaRPr lang="de-DE" sz="3600" dirty="0"/>
+            <a:endParaRPr lang="de-DE" sz="3200" dirty="0"/>
           </a:p>
         </p:txBody>
       </p:sp>
@@ -3886,10 +3888,168 @@
           </a:p>
         </p:txBody>
       </p:sp>
+      <p:pic>
+        <p:nvPicPr>
+          <p:cNvPr id="9" name="Grafik 8">
+            <a:extLst>
+              <a:ext uri="{FF2B5EF4-FFF2-40B4-BE49-F238E27FC236}">
+                <a16:creationId xmlns:a16="http://schemas.microsoft.com/office/drawing/2014/main" id="{9EA6CC68-5F4D-498B-9264-71FC62B623B7}"/>
+              </a:ext>
+            </a:extLst>
+          </p:cNvPr>
+          <p:cNvPicPr>
+            <a:picLocks noChangeAspect="1"/>
+          </p:cNvPicPr>
+          <p:nvPr/>
+        </p:nvPicPr>
+        <p:blipFill>
+          <a:blip r:embed="rId2" cstate="print">
+            <a:extLst>
+              <a:ext uri="{28A0092B-C50C-407E-A947-70E740481C1C}">
+                <a14:useLocalDpi xmlns:a14="http://schemas.microsoft.com/office/drawing/2010/main" val="0"/>
+              </a:ext>
+            </a:extLst>
+          </a:blip>
+          <a:stretch>
+            <a:fillRect/>
+          </a:stretch>
+        </p:blipFill>
+        <p:spPr>
+          <a:xfrm>
+            <a:off x="5970951" y="625215"/>
+            <a:ext cx="3110523" cy="625215"/>
+          </a:xfrm>
+          <a:prstGeom prst="rect">
+            <a:avLst/>
+          </a:prstGeom>
+        </p:spPr>
+      </p:pic>
     </p:spTree>
     <p:extLst>
       <p:ext uri="{BB962C8B-B14F-4D97-AF65-F5344CB8AC3E}">
         <p14:creationId xmlns:p14="http://schemas.microsoft.com/office/powerpoint/2010/main" val="2313134025"/>
+      </p:ext>
+    </p:extLst>
+  </p:cSld>
+  <p:clrMapOvr>
+    <a:masterClrMapping/>
+  </p:clrMapOvr>
+</p:sld>
+</file>
+
+<file path=ppt/slides/slide10.xml><?xml version="1.0" encoding="utf-8"?>
+<p:sld xmlns:a="http://schemas.openxmlformats.org/drawingml/2006/main" xmlns:r="http://schemas.openxmlformats.org/officeDocument/2006/relationships" xmlns:p="http://schemas.openxmlformats.org/presentationml/2006/main">
+  <p:cSld>
+    <p:spTree>
+      <p:nvGrpSpPr>
+        <p:cNvPr id="1" name=""/>
+        <p:cNvGrpSpPr/>
+        <p:nvPr/>
+      </p:nvGrpSpPr>
+      <p:grpSpPr>
+        <a:xfrm>
+          <a:off x="0" y="0"/>
+          <a:ext cx="0" cy="0"/>
+          <a:chOff x="0" y="0"/>
+          <a:chExt cx="0" cy="0"/>
+        </a:xfrm>
+      </p:grpSpPr>
+      <p:sp>
+        <p:nvSpPr>
+          <p:cNvPr id="2" name="Titel 1">
+            <a:extLst>
+              <a:ext uri="{FF2B5EF4-FFF2-40B4-BE49-F238E27FC236}">
+                <a16:creationId xmlns:a16="http://schemas.microsoft.com/office/drawing/2014/main" id="{2D3B589F-1C6D-475E-8FE9-0168CC3AABC4}"/>
+              </a:ext>
+            </a:extLst>
+          </p:cNvPr>
+          <p:cNvSpPr>
+            <a:spLocks noGrp="1"/>
+          </p:cNvSpPr>
+          <p:nvPr>
+            <p:ph type="title"/>
+          </p:nvPr>
+        </p:nvSpPr>
+        <p:spPr/>
+        <p:txBody>
+          <a:bodyPr/>
+          <a:lstStyle/>
+          <a:p>
+            <a:r>
+              <a:rPr lang="de-DE" dirty="0"/>
+              <a:t>Literaturverzeichnis</a:t>
+            </a:r>
+          </a:p>
+        </p:txBody>
+      </p:sp>
+      <p:sp>
+        <p:nvSpPr>
+          <p:cNvPr id="3" name="Inhaltsplatzhalter 2">
+            <a:extLst>
+              <a:ext uri="{FF2B5EF4-FFF2-40B4-BE49-F238E27FC236}">
+                <a16:creationId xmlns:a16="http://schemas.microsoft.com/office/drawing/2014/main" id="{9960FD88-4715-4720-BEBA-B6DCFAFF1B76}"/>
+              </a:ext>
+            </a:extLst>
+          </p:cNvPr>
+          <p:cNvSpPr>
+            <a:spLocks noGrp="1"/>
+          </p:cNvSpPr>
+          <p:nvPr>
+            <p:ph idx="1"/>
+          </p:nvPr>
+        </p:nvSpPr>
+        <p:spPr/>
+        <p:txBody>
+          <a:bodyPr/>
+          <a:lstStyle/>
+          <a:p>
+            <a:r>
+              <a:rPr lang="de-DE" dirty="0"/>
+              <a:t>Von Verwandte Arbeiten</a:t>
+            </a:r>
+          </a:p>
+        </p:txBody>
+      </p:sp>
+      <p:pic>
+        <p:nvPicPr>
+          <p:cNvPr id="4" name="Grafik 3">
+            <a:extLst>
+              <a:ext uri="{FF2B5EF4-FFF2-40B4-BE49-F238E27FC236}">
+                <a16:creationId xmlns:a16="http://schemas.microsoft.com/office/drawing/2014/main" id="{40AC29C5-A9F4-47F0-8B8E-6C04AE687FE0}"/>
+              </a:ext>
+            </a:extLst>
+          </p:cNvPr>
+          <p:cNvPicPr>
+            <a:picLocks noChangeAspect="1"/>
+          </p:cNvPicPr>
+          <p:nvPr/>
+        </p:nvPicPr>
+        <p:blipFill>
+          <a:blip r:embed="rId2" cstate="print">
+            <a:extLst>
+              <a:ext uri="{28A0092B-C50C-407E-A947-70E740481C1C}">
+                <a14:useLocalDpi xmlns:a14="http://schemas.microsoft.com/office/drawing/2010/main" val="0"/>
+              </a:ext>
+            </a:extLst>
+          </a:blip>
+          <a:stretch>
+            <a:fillRect/>
+          </a:stretch>
+        </p:blipFill>
+        <p:spPr>
+          <a:xfrm>
+            <a:off x="8471877" y="469204"/>
+            <a:ext cx="3110523" cy="625215"/>
+          </a:xfrm>
+          <a:prstGeom prst="rect">
+            <a:avLst/>
+          </a:prstGeom>
+        </p:spPr>
+      </p:pic>
+    </p:spTree>
+    <p:extLst>
+      <p:ext uri="{BB962C8B-B14F-4D97-AF65-F5344CB8AC3E}">
+        <p14:creationId xmlns:p14="http://schemas.microsoft.com/office/powerpoint/2010/main" val="3629511036"/>
       </p:ext>
     </p:extLst>
   </p:cSld>
@@ -3937,7 +4097,10 @@
           <a:bodyPr/>
           <a:lstStyle/>
           <a:p>
-            <a:endParaRPr lang="de-DE"/>
+            <a:r>
+              <a:rPr lang="de-DE" dirty="0"/>
+              <a:t>Einleitung</a:t>
+            </a:r>
           </a:p>
         </p:txBody>
       </p:sp>
@@ -3962,10 +4125,49 @@
           <a:bodyPr/>
           <a:lstStyle/>
           <a:p>
-            <a:endParaRPr lang="de-DE"/>
-          </a:p>
-        </p:txBody>
-      </p:sp>
+            <a:r>
+              <a:rPr lang="de-DE" dirty="0"/>
+              <a:t>Motivation</a:t>
+            </a:r>
+          </a:p>
+        </p:txBody>
+      </p:sp>
+      <p:pic>
+        <p:nvPicPr>
+          <p:cNvPr id="4" name="Grafik 3">
+            <a:extLst>
+              <a:ext uri="{FF2B5EF4-FFF2-40B4-BE49-F238E27FC236}">
+                <a16:creationId xmlns:a16="http://schemas.microsoft.com/office/drawing/2014/main" id="{08007C9A-87A6-4D4D-8535-EB98A45C15FF}"/>
+              </a:ext>
+            </a:extLst>
+          </p:cNvPr>
+          <p:cNvPicPr>
+            <a:picLocks noChangeAspect="1"/>
+          </p:cNvPicPr>
+          <p:nvPr/>
+        </p:nvPicPr>
+        <p:blipFill>
+          <a:blip r:embed="rId2" cstate="print">
+            <a:extLst>
+              <a:ext uri="{28A0092B-C50C-407E-A947-70E740481C1C}">
+                <a14:useLocalDpi xmlns:a14="http://schemas.microsoft.com/office/drawing/2010/main" val="0"/>
+              </a:ext>
+            </a:extLst>
+          </a:blip>
+          <a:stretch>
+            <a:fillRect/>
+          </a:stretch>
+        </p:blipFill>
+        <p:spPr>
+          <a:xfrm>
+            <a:off x="8471877" y="469204"/>
+            <a:ext cx="3110523" cy="625215"/>
+          </a:xfrm>
+          <a:prstGeom prst="rect">
+            <a:avLst/>
+          </a:prstGeom>
+        </p:spPr>
+      </p:pic>
     </p:spTree>
     <p:extLst>
       <p:ext uri="{BB962C8B-B14F-4D97-AF65-F5344CB8AC3E}">
@@ -3979,8 +4181,908 @@
 </p:sld>
 </file>
 
+<file path=ppt/slides/slide3.xml><?xml version="1.0" encoding="utf-8"?>
+<p:sld xmlns:a="http://schemas.openxmlformats.org/drawingml/2006/main" xmlns:r="http://schemas.openxmlformats.org/officeDocument/2006/relationships" xmlns:p="http://schemas.openxmlformats.org/presentationml/2006/main">
+  <p:cSld>
+    <p:spTree>
+      <p:nvGrpSpPr>
+        <p:cNvPr id="1" name=""/>
+        <p:cNvGrpSpPr/>
+        <p:nvPr/>
+      </p:nvGrpSpPr>
+      <p:grpSpPr>
+        <a:xfrm>
+          <a:off x="0" y="0"/>
+          <a:ext cx="0" cy="0"/>
+          <a:chOff x="0" y="0"/>
+          <a:chExt cx="0" cy="0"/>
+        </a:xfrm>
+      </p:grpSpPr>
+      <p:sp>
+        <p:nvSpPr>
+          <p:cNvPr id="2" name="Titel 1">
+            <a:extLst>
+              <a:ext uri="{FF2B5EF4-FFF2-40B4-BE49-F238E27FC236}">
+                <a16:creationId xmlns:a16="http://schemas.microsoft.com/office/drawing/2014/main" id="{9516B081-B15A-4550-8FC2-7218AE500383}"/>
+              </a:ext>
+            </a:extLst>
+          </p:cNvPr>
+          <p:cNvSpPr>
+            <a:spLocks noGrp="1"/>
+          </p:cNvSpPr>
+          <p:nvPr>
+            <p:ph type="title"/>
+          </p:nvPr>
+        </p:nvSpPr>
+        <p:spPr/>
+        <p:txBody>
+          <a:bodyPr/>
+          <a:lstStyle/>
+          <a:p>
+            <a:r>
+              <a:rPr lang="de-DE" dirty="0"/>
+              <a:t>Einleitung</a:t>
+            </a:r>
+          </a:p>
+        </p:txBody>
+      </p:sp>
+      <p:sp>
+        <p:nvSpPr>
+          <p:cNvPr id="3" name="Inhaltsplatzhalter 2">
+            <a:extLst>
+              <a:ext uri="{FF2B5EF4-FFF2-40B4-BE49-F238E27FC236}">
+                <a16:creationId xmlns:a16="http://schemas.microsoft.com/office/drawing/2014/main" id="{76803973-686B-4569-BEE3-31F720706EA0}"/>
+              </a:ext>
+            </a:extLst>
+          </p:cNvPr>
+          <p:cNvSpPr>
+            <a:spLocks noGrp="1"/>
+          </p:cNvSpPr>
+          <p:nvPr>
+            <p:ph idx="1"/>
+          </p:nvPr>
+        </p:nvSpPr>
+        <p:spPr/>
+        <p:txBody>
+          <a:bodyPr/>
+          <a:lstStyle/>
+          <a:p>
+            <a:r>
+              <a:rPr lang="de-DE" dirty="0"/>
+              <a:t>Herausforderungen</a:t>
+            </a:r>
+          </a:p>
+          <a:p>
+            <a:r>
+              <a:rPr lang="de-DE" dirty="0"/>
+              <a:t>Ziele und Anforderungen</a:t>
+            </a:r>
+          </a:p>
+        </p:txBody>
+      </p:sp>
+      <p:pic>
+        <p:nvPicPr>
+          <p:cNvPr id="4" name="Grafik 3">
+            <a:extLst>
+              <a:ext uri="{FF2B5EF4-FFF2-40B4-BE49-F238E27FC236}">
+                <a16:creationId xmlns:a16="http://schemas.microsoft.com/office/drawing/2014/main" id="{FC843913-2D84-4A1A-8901-4883DA8ED1E7}"/>
+              </a:ext>
+            </a:extLst>
+          </p:cNvPr>
+          <p:cNvPicPr>
+            <a:picLocks noChangeAspect="1"/>
+          </p:cNvPicPr>
+          <p:nvPr/>
+        </p:nvPicPr>
+        <p:blipFill>
+          <a:blip r:embed="rId2" cstate="print">
+            <a:extLst>
+              <a:ext uri="{28A0092B-C50C-407E-A947-70E740481C1C}">
+                <a14:useLocalDpi xmlns:a14="http://schemas.microsoft.com/office/drawing/2010/main" val="0"/>
+              </a:ext>
+            </a:extLst>
+          </a:blip>
+          <a:stretch>
+            <a:fillRect/>
+          </a:stretch>
+        </p:blipFill>
+        <p:spPr>
+          <a:xfrm>
+            <a:off x="8471877" y="469204"/>
+            <a:ext cx="3110523" cy="625215"/>
+          </a:xfrm>
+          <a:prstGeom prst="rect">
+            <a:avLst/>
+          </a:prstGeom>
+        </p:spPr>
+      </p:pic>
+    </p:spTree>
+    <p:extLst>
+      <p:ext uri="{BB962C8B-B14F-4D97-AF65-F5344CB8AC3E}">
+        <p14:creationId xmlns:p14="http://schemas.microsoft.com/office/powerpoint/2010/main" val="2818423193"/>
+      </p:ext>
+    </p:extLst>
+  </p:cSld>
+  <p:clrMapOvr>
+    <a:masterClrMapping/>
+  </p:clrMapOvr>
+</p:sld>
+</file>
+
+<file path=ppt/slides/slide4.xml><?xml version="1.0" encoding="utf-8"?>
+<p:sld xmlns:a="http://schemas.openxmlformats.org/drawingml/2006/main" xmlns:r="http://schemas.openxmlformats.org/officeDocument/2006/relationships" xmlns:p="http://schemas.openxmlformats.org/presentationml/2006/main">
+  <p:cSld>
+    <p:spTree>
+      <p:nvGrpSpPr>
+        <p:cNvPr id="1" name=""/>
+        <p:cNvGrpSpPr/>
+        <p:nvPr/>
+      </p:nvGrpSpPr>
+      <p:grpSpPr>
+        <a:xfrm>
+          <a:off x="0" y="0"/>
+          <a:ext cx="0" cy="0"/>
+          <a:chOff x="0" y="0"/>
+          <a:chExt cx="0" cy="0"/>
+        </a:xfrm>
+      </p:grpSpPr>
+      <p:sp>
+        <p:nvSpPr>
+          <p:cNvPr id="2" name="Titel 1">
+            <a:extLst>
+              <a:ext uri="{FF2B5EF4-FFF2-40B4-BE49-F238E27FC236}">
+                <a16:creationId xmlns:a16="http://schemas.microsoft.com/office/drawing/2014/main" id="{DD9825E3-A377-43EE-8118-986E2408AB1C}"/>
+              </a:ext>
+            </a:extLst>
+          </p:cNvPr>
+          <p:cNvSpPr>
+            <a:spLocks noGrp="1"/>
+          </p:cNvSpPr>
+          <p:nvPr>
+            <p:ph type="title"/>
+          </p:nvPr>
+        </p:nvSpPr>
+        <p:spPr/>
+        <p:txBody>
+          <a:bodyPr/>
+          <a:lstStyle/>
+          <a:p>
+            <a:r>
+              <a:rPr lang="de-DE" dirty="0"/>
+              <a:t>Gliederung</a:t>
+            </a:r>
+          </a:p>
+        </p:txBody>
+      </p:sp>
+      <p:sp>
+        <p:nvSpPr>
+          <p:cNvPr id="3" name="Inhaltsplatzhalter 2">
+            <a:extLst>
+              <a:ext uri="{FF2B5EF4-FFF2-40B4-BE49-F238E27FC236}">
+                <a16:creationId xmlns:a16="http://schemas.microsoft.com/office/drawing/2014/main" id="{CAE452CF-4FEA-47BD-B91D-496CCF2162A2}"/>
+              </a:ext>
+            </a:extLst>
+          </p:cNvPr>
+          <p:cNvSpPr>
+            <a:spLocks noGrp="1"/>
+          </p:cNvSpPr>
+          <p:nvPr>
+            <p:ph idx="1"/>
+          </p:nvPr>
+        </p:nvSpPr>
+        <p:spPr/>
+        <p:txBody>
+          <a:bodyPr/>
+          <a:lstStyle/>
+          <a:p>
+            <a:r>
+              <a:rPr lang="de-DE" dirty="0"/>
+              <a:t>Einleitung</a:t>
+            </a:r>
+          </a:p>
+          <a:p>
+            <a:r>
+              <a:rPr lang="de-DE" dirty="0"/>
+              <a:t>Verwandte Arbeiten</a:t>
+            </a:r>
+          </a:p>
+          <a:p>
+            <a:r>
+              <a:rPr lang="de-DE" dirty="0"/>
+              <a:t>#Das Verfahren</a:t>
+            </a:r>
+          </a:p>
+          <a:p>
+            <a:r>
+              <a:rPr lang="de-DE" dirty="0"/>
+              <a:t>#Bildextrapolation</a:t>
+            </a:r>
+          </a:p>
+          <a:p>
+            <a:r>
+              <a:rPr lang="de-DE" dirty="0"/>
+              <a:t>#Bildkomposition</a:t>
+            </a:r>
+          </a:p>
+          <a:p>
+            <a:r>
+              <a:rPr lang="de-DE" dirty="0"/>
+              <a:t>Evaluation</a:t>
+            </a:r>
+          </a:p>
+          <a:p>
+            <a:r>
+              <a:rPr lang="de-DE" dirty="0"/>
+              <a:t>Fazit</a:t>
+            </a:r>
+          </a:p>
+          <a:p>
+            <a:r>
+              <a:rPr lang="de-DE" dirty="0"/>
+              <a:t>Ausblick</a:t>
+            </a:r>
+          </a:p>
+          <a:p>
+            <a:r>
+              <a:rPr lang="de-DE" dirty="0"/>
+              <a:t>Literaturverzeichnis</a:t>
+            </a:r>
+          </a:p>
+        </p:txBody>
+      </p:sp>
+      <p:pic>
+        <p:nvPicPr>
+          <p:cNvPr id="5" name="Grafik 4">
+            <a:extLst>
+              <a:ext uri="{FF2B5EF4-FFF2-40B4-BE49-F238E27FC236}">
+                <a16:creationId xmlns:a16="http://schemas.microsoft.com/office/drawing/2014/main" id="{E182A1F4-936A-4018-8B3D-95C34D5E4CE5}"/>
+              </a:ext>
+            </a:extLst>
+          </p:cNvPr>
+          <p:cNvPicPr>
+            <a:picLocks noChangeAspect="1"/>
+          </p:cNvPicPr>
+          <p:nvPr/>
+        </p:nvPicPr>
+        <p:blipFill>
+          <a:blip r:embed="rId2" cstate="print">
+            <a:extLst>
+              <a:ext uri="{28A0092B-C50C-407E-A947-70E740481C1C}">
+                <a14:useLocalDpi xmlns:a14="http://schemas.microsoft.com/office/drawing/2010/main" val="0"/>
+              </a:ext>
+            </a:extLst>
+          </a:blip>
+          <a:stretch>
+            <a:fillRect/>
+          </a:stretch>
+        </p:blipFill>
+        <p:spPr>
+          <a:xfrm>
+            <a:off x="8471877" y="469204"/>
+            <a:ext cx="3110523" cy="625215"/>
+          </a:xfrm>
+          <a:prstGeom prst="rect">
+            <a:avLst/>
+          </a:prstGeom>
+        </p:spPr>
+      </p:pic>
+    </p:spTree>
+    <p:extLst>
+      <p:ext uri="{BB962C8B-B14F-4D97-AF65-F5344CB8AC3E}">
+        <p14:creationId xmlns:p14="http://schemas.microsoft.com/office/powerpoint/2010/main" val="2699689690"/>
+      </p:ext>
+    </p:extLst>
+  </p:cSld>
+  <p:clrMapOvr>
+    <a:masterClrMapping/>
+  </p:clrMapOvr>
+</p:sld>
+</file>
+
+<file path=ppt/slides/slide5.xml><?xml version="1.0" encoding="utf-8"?>
+<p:sld xmlns:a="http://schemas.openxmlformats.org/drawingml/2006/main" xmlns:r="http://schemas.openxmlformats.org/officeDocument/2006/relationships" xmlns:p="http://schemas.openxmlformats.org/presentationml/2006/main">
+  <p:cSld>
+    <p:spTree>
+      <p:nvGrpSpPr>
+        <p:cNvPr id="1" name=""/>
+        <p:cNvGrpSpPr/>
+        <p:nvPr/>
+      </p:nvGrpSpPr>
+      <p:grpSpPr>
+        <a:xfrm>
+          <a:off x="0" y="0"/>
+          <a:ext cx="0" cy="0"/>
+          <a:chOff x="0" y="0"/>
+          <a:chExt cx="0" cy="0"/>
+        </a:xfrm>
+      </p:grpSpPr>
+      <p:sp>
+        <p:nvSpPr>
+          <p:cNvPr id="2" name="Titel 1">
+            <a:extLst>
+              <a:ext uri="{FF2B5EF4-FFF2-40B4-BE49-F238E27FC236}">
+                <a16:creationId xmlns:a16="http://schemas.microsoft.com/office/drawing/2014/main" id="{2E1F2530-87A4-414D-B01B-CF124AFBEAA3}"/>
+              </a:ext>
+            </a:extLst>
+          </p:cNvPr>
+          <p:cNvSpPr>
+            <a:spLocks noGrp="1"/>
+          </p:cNvSpPr>
+          <p:nvPr>
+            <p:ph type="title"/>
+          </p:nvPr>
+        </p:nvSpPr>
+        <p:spPr/>
+        <p:txBody>
+          <a:bodyPr/>
+          <a:lstStyle/>
+          <a:p>
+            <a:r>
+              <a:rPr lang="de-DE"/>
+              <a:t>Verwandte Arbeiten</a:t>
+            </a:r>
+            <a:endParaRPr lang="de-DE" dirty="0"/>
+          </a:p>
+        </p:txBody>
+      </p:sp>
+      <p:sp>
+        <p:nvSpPr>
+          <p:cNvPr id="3" name="Inhaltsplatzhalter 2">
+            <a:extLst>
+              <a:ext uri="{FF2B5EF4-FFF2-40B4-BE49-F238E27FC236}">
+                <a16:creationId xmlns:a16="http://schemas.microsoft.com/office/drawing/2014/main" id="{8A7B857E-D6C0-4153-8B44-924D9AB79CF2}"/>
+              </a:ext>
+            </a:extLst>
+          </p:cNvPr>
+          <p:cNvSpPr>
+            <a:spLocks noGrp="1"/>
+          </p:cNvSpPr>
+          <p:nvPr>
+            <p:ph idx="1"/>
+          </p:nvPr>
+        </p:nvSpPr>
+        <p:spPr/>
+        <p:txBody>
+          <a:bodyPr/>
+          <a:lstStyle/>
+          <a:p>
+            <a:endParaRPr lang="de-DE" dirty="0"/>
+          </a:p>
+        </p:txBody>
+      </p:sp>
+      <p:pic>
+        <p:nvPicPr>
+          <p:cNvPr id="4" name="Grafik 3">
+            <a:extLst>
+              <a:ext uri="{FF2B5EF4-FFF2-40B4-BE49-F238E27FC236}">
+                <a16:creationId xmlns:a16="http://schemas.microsoft.com/office/drawing/2014/main" id="{9B6A495F-D2F5-434C-90BF-776A2B1859FA}"/>
+              </a:ext>
+            </a:extLst>
+          </p:cNvPr>
+          <p:cNvPicPr>
+            <a:picLocks noChangeAspect="1"/>
+          </p:cNvPicPr>
+          <p:nvPr/>
+        </p:nvPicPr>
+        <p:blipFill>
+          <a:blip r:embed="rId2" cstate="print">
+            <a:extLst>
+              <a:ext uri="{28A0092B-C50C-407E-A947-70E740481C1C}">
+                <a14:useLocalDpi xmlns:a14="http://schemas.microsoft.com/office/drawing/2010/main" val="0"/>
+              </a:ext>
+            </a:extLst>
+          </a:blip>
+          <a:stretch>
+            <a:fillRect/>
+          </a:stretch>
+        </p:blipFill>
+        <p:spPr>
+          <a:xfrm>
+            <a:off x="8471877" y="469204"/>
+            <a:ext cx="3110523" cy="625215"/>
+          </a:xfrm>
+          <a:prstGeom prst="rect">
+            <a:avLst/>
+          </a:prstGeom>
+        </p:spPr>
+      </p:pic>
+    </p:spTree>
+    <p:extLst>
+      <p:ext uri="{BB962C8B-B14F-4D97-AF65-F5344CB8AC3E}">
+        <p14:creationId xmlns:p14="http://schemas.microsoft.com/office/powerpoint/2010/main" val="479973310"/>
+      </p:ext>
+    </p:extLst>
+  </p:cSld>
+  <p:clrMapOvr>
+    <a:masterClrMapping/>
+  </p:clrMapOvr>
+</p:sld>
+</file>
+
+<file path=ppt/slides/slide6.xml><?xml version="1.0" encoding="utf-8"?>
+<p:sld xmlns:a="http://schemas.openxmlformats.org/drawingml/2006/main" xmlns:r="http://schemas.openxmlformats.org/officeDocument/2006/relationships" xmlns:p="http://schemas.openxmlformats.org/presentationml/2006/main">
+  <p:cSld>
+    <p:spTree>
+      <p:nvGrpSpPr>
+        <p:cNvPr id="1" name=""/>
+        <p:cNvGrpSpPr/>
+        <p:nvPr/>
+      </p:nvGrpSpPr>
+      <p:grpSpPr>
+        <a:xfrm>
+          <a:off x="0" y="0"/>
+          <a:ext cx="0" cy="0"/>
+          <a:chOff x="0" y="0"/>
+          <a:chExt cx="0" cy="0"/>
+        </a:xfrm>
+      </p:grpSpPr>
+      <p:sp>
+        <p:nvSpPr>
+          <p:cNvPr id="2" name="Titel 1">
+            <a:extLst>
+              <a:ext uri="{FF2B5EF4-FFF2-40B4-BE49-F238E27FC236}">
+                <a16:creationId xmlns:a16="http://schemas.microsoft.com/office/drawing/2014/main" id="{4B81EDF3-0332-4EC8-94D7-B8031CAE2195}"/>
+              </a:ext>
+            </a:extLst>
+          </p:cNvPr>
+          <p:cNvSpPr>
+            <a:spLocks noGrp="1"/>
+          </p:cNvSpPr>
+          <p:nvPr>
+            <p:ph type="title"/>
+          </p:nvPr>
+        </p:nvSpPr>
+        <p:spPr/>
+        <p:txBody>
+          <a:bodyPr/>
+          <a:lstStyle/>
+          <a:p>
+            <a:r>
+              <a:rPr lang="de-DE" dirty="0"/>
+              <a:t>INHALT</a:t>
+            </a:r>
+          </a:p>
+        </p:txBody>
+      </p:sp>
+      <p:sp>
+        <p:nvSpPr>
+          <p:cNvPr id="3" name="Inhaltsplatzhalter 2">
+            <a:extLst>
+              <a:ext uri="{FF2B5EF4-FFF2-40B4-BE49-F238E27FC236}">
+                <a16:creationId xmlns:a16="http://schemas.microsoft.com/office/drawing/2014/main" id="{0258BEC3-6486-4C43-89D1-9E484DF7AF0B}"/>
+              </a:ext>
+            </a:extLst>
+          </p:cNvPr>
+          <p:cNvSpPr>
+            <a:spLocks noGrp="1"/>
+          </p:cNvSpPr>
+          <p:nvPr>
+            <p:ph idx="1"/>
+          </p:nvPr>
+        </p:nvSpPr>
+        <p:spPr/>
+        <p:txBody>
+          <a:bodyPr/>
+          <a:lstStyle/>
+          <a:p>
+            <a:endParaRPr lang="de-DE"/>
+          </a:p>
+        </p:txBody>
+      </p:sp>
+      <p:pic>
+        <p:nvPicPr>
+          <p:cNvPr id="4" name="Grafik 3">
+            <a:extLst>
+              <a:ext uri="{FF2B5EF4-FFF2-40B4-BE49-F238E27FC236}">
+                <a16:creationId xmlns:a16="http://schemas.microsoft.com/office/drawing/2014/main" id="{C7FFE849-C6C4-4797-981C-5302BE3605BD}"/>
+              </a:ext>
+            </a:extLst>
+          </p:cNvPr>
+          <p:cNvPicPr>
+            <a:picLocks noChangeAspect="1"/>
+          </p:cNvPicPr>
+          <p:nvPr/>
+        </p:nvPicPr>
+        <p:blipFill>
+          <a:blip r:embed="rId2" cstate="print">
+            <a:extLst>
+              <a:ext uri="{28A0092B-C50C-407E-A947-70E740481C1C}">
+                <a14:useLocalDpi xmlns:a14="http://schemas.microsoft.com/office/drawing/2010/main" val="0"/>
+              </a:ext>
+            </a:extLst>
+          </a:blip>
+          <a:stretch>
+            <a:fillRect/>
+          </a:stretch>
+        </p:blipFill>
+        <p:spPr>
+          <a:xfrm>
+            <a:off x="8471877" y="469204"/>
+            <a:ext cx="3110523" cy="625215"/>
+          </a:xfrm>
+          <a:prstGeom prst="rect">
+            <a:avLst/>
+          </a:prstGeom>
+        </p:spPr>
+      </p:pic>
+    </p:spTree>
+    <p:extLst>
+      <p:ext uri="{BB962C8B-B14F-4D97-AF65-F5344CB8AC3E}">
+        <p14:creationId xmlns:p14="http://schemas.microsoft.com/office/powerpoint/2010/main" val="351916321"/>
+      </p:ext>
+    </p:extLst>
+  </p:cSld>
+  <p:clrMapOvr>
+    <a:masterClrMapping/>
+  </p:clrMapOvr>
+</p:sld>
+</file>
+
+<file path=ppt/slides/slide7.xml><?xml version="1.0" encoding="utf-8"?>
+<p:sld xmlns:a="http://schemas.openxmlformats.org/drawingml/2006/main" xmlns:r="http://schemas.openxmlformats.org/officeDocument/2006/relationships" xmlns:p="http://schemas.openxmlformats.org/presentationml/2006/main">
+  <p:cSld>
+    <p:spTree>
+      <p:nvGrpSpPr>
+        <p:cNvPr id="1" name=""/>
+        <p:cNvGrpSpPr/>
+        <p:nvPr/>
+      </p:nvGrpSpPr>
+      <p:grpSpPr>
+        <a:xfrm>
+          <a:off x="0" y="0"/>
+          <a:ext cx="0" cy="0"/>
+          <a:chOff x="0" y="0"/>
+          <a:chExt cx="0" cy="0"/>
+        </a:xfrm>
+      </p:grpSpPr>
+      <p:sp>
+        <p:nvSpPr>
+          <p:cNvPr id="2" name="Titel 1">
+            <a:extLst>
+              <a:ext uri="{FF2B5EF4-FFF2-40B4-BE49-F238E27FC236}">
+                <a16:creationId xmlns:a16="http://schemas.microsoft.com/office/drawing/2014/main" id="{AC37F681-D593-4C5A-804C-DD5ECFFC0DE2}"/>
+              </a:ext>
+            </a:extLst>
+          </p:cNvPr>
+          <p:cNvSpPr>
+            <a:spLocks noGrp="1"/>
+          </p:cNvSpPr>
+          <p:nvPr>
+            <p:ph type="title"/>
+          </p:nvPr>
+        </p:nvSpPr>
+        <p:spPr/>
+        <p:txBody>
+          <a:bodyPr/>
+          <a:lstStyle/>
+          <a:p>
+            <a:r>
+              <a:rPr lang="de-DE" dirty="0"/>
+              <a:t>Evaluation</a:t>
+            </a:r>
+          </a:p>
+        </p:txBody>
+      </p:sp>
+      <p:sp>
+        <p:nvSpPr>
+          <p:cNvPr id="3" name="Inhaltsplatzhalter 2">
+            <a:extLst>
+              <a:ext uri="{FF2B5EF4-FFF2-40B4-BE49-F238E27FC236}">
+                <a16:creationId xmlns:a16="http://schemas.microsoft.com/office/drawing/2014/main" id="{486EE2B7-E9A7-4C56-8220-05CE400B7479}"/>
+              </a:ext>
+            </a:extLst>
+          </p:cNvPr>
+          <p:cNvSpPr>
+            <a:spLocks noGrp="1"/>
+          </p:cNvSpPr>
+          <p:nvPr>
+            <p:ph idx="1"/>
+          </p:nvPr>
+        </p:nvSpPr>
+        <p:spPr/>
+        <p:txBody>
+          <a:bodyPr/>
+          <a:lstStyle/>
+          <a:p>
+            <a:endParaRPr lang="de-DE"/>
+          </a:p>
+        </p:txBody>
+      </p:sp>
+      <p:pic>
+        <p:nvPicPr>
+          <p:cNvPr id="4" name="Grafik 3">
+            <a:extLst>
+              <a:ext uri="{FF2B5EF4-FFF2-40B4-BE49-F238E27FC236}">
+                <a16:creationId xmlns:a16="http://schemas.microsoft.com/office/drawing/2014/main" id="{0717B915-48F3-46BA-9236-1BE121D67925}"/>
+              </a:ext>
+            </a:extLst>
+          </p:cNvPr>
+          <p:cNvPicPr>
+            <a:picLocks noChangeAspect="1"/>
+          </p:cNvPicPr>
+          <p:nvPr/>
+        </p:nvPicPr>
+        <p:blipFill>
+          <a:blip r:embed="rId2" cstate="print">
+            <a:extLst>
+              <a:ext uri="{28A0092B-C50C-407E-A947-70E740481C1C}">
+                <a14:useLocalDpi xmlns:a14="http://schemas.microsoft.com/office/drawing/2010/main" val="0"/>
+              </a:ext>
+            </a:extLst>
+          </a:blip>
+          <a:stretch>
+            <a:fillRect/>
+          </a:stretch>
+        </p:blipFill>
+        <p:spPr>
+          <a:xfrm>
+            <a:off x="8471877" y="469204"/>
+            <a:ext cx="3110523" cy="625215"/>
+          </a:xfrm>
+          <a:prstGeom prst="rect">
+            <a:avLst/>
+          </a:prstGeom>
+        </p:spPr>
+      </p:pic>
+    </p:spTree>
+    <p:extLst>
+      <p:ext uri="{BB962C8B-B14F-4D97-AF65-F5344CB8AC3E}">
+        <p14:creationId xmlns:p14="http://schemas.microsoft.com/office/powerpoint/2010/main" val="755854998"/>
+      </p:ext>
+    </p:extLst>
+  </p:cSld>
+  <p:clrMapOvr>
+    <a:masterClrMapping/>
+  </p:clrMapOvr>
+</p:sld>
+</file>
+
+<file path=ppt/slides/slide8.xml><?xml version="1.0" encoding="utf-8"?>
+<p:sld xmlns:a="http://schemas.openxmlformats.org/drawingml/2006/main" xmlns:r="http://schemas.openxmlformats.org/officeDocument/2006/relationships" xmlns:p="http://schemas.openxmlformats.org/presentationml/2006/main">
+  <p:cSld>
+    <p:spTree>
+      <p:nvGrpSpPr>
+        <p:cNvPr id="1" name=""/>
+        <p:cNvGrpSpPr/>
+        <p:nvPr/>
+      </p:nvGrpSpPr>
+      <p:grpSpPr>
+        <a:xfrm>
+          <a:off x="0" y="0"/>
+          <a:ext cx="0" cy="0"/>
+          <a:chOff x="0" y="0"/>
+          <a:chExt cx="0" cy="0"/>
+        </a:xfrm>
+      </p:grpSpPr>
+      <p:sp>
+        <p:nvSpPr>
+          <p:cNvPr id="2" name="Titel 1">
+            <a:extLst>
+              <a:ext uri="{FF2B5EF4-FFF2-40B4-BE49-F238E27FC236}">
+                <a16:creationId xmlns:a16="http://schemas.microsoft.com/office/drawing/2014/main" id="{47821B0B-73C7-4D74-85E5-D26A3775FE05}"/>
+              </a:ext>
+            </a:extLst>
+          </p:cNvPr>
+          <p:cNvSpPr>
+            <a:spLocks noGrp="1"/>
+          </p:cNvSpPr>
+          <p:nvPr>
+            <p:ph type="title"/>
+          </p:nvPr>
+        </p:nvSpPr>
+        <p:spPr/>
+        <p:txBody>
+          <a:bodyPr/>
+          <a:lstStyle/>
+          <a:p>
+            <a:r>
+              <a:rPr lang="de-DE" dirty="0"/>
+              <a:t>Fazit</a:t>
+            </a:r>
+          </a:p>
+        </p:txBody>
+      </p:sp>
+      <p:sp>
+        <p:nvSpPr>
+          <p:cNvPr id="3" name="Inhaltsplatzhalter 2">
+            <a:extLst>
+              <a:ext uri="{FF2B5EF4-FFF2-40B4-BE49-F238E27FC236}">
+                <a16:creationId xmlns:a16="http://schemas.microsoft.com/office/drawing/2014/main" id="{8C5558C3-2B3A-483D-AF2B-430FA216346F}"/>
+              </a:ext>
+            </a:extLst>
+          </p:cNvPr>
+          <p:cNvSpPr>
+            <a:spLocks noGrp="1"/>
+          </p:cNvSpPr>
+          <p:nvPr>
+            <p:ph idx="1"/>
+          </p:nvPr>
+        </p:nvSpPr>
+        <p:spPr/>
+        <p:txBody>
+          <a:bodyPr/>
+          <a:lstStyle/>
+          <a:p>
+            <a:r>
+              <a:rPr lang="de-DE" dirty="0"/>
+              <a:t>Ergebnisse</a:t>
+            </a:r>
+          </a:p>
+        </p:txBody>
+      </p:sp>
+      <p:pic>
+        <p:nvPicPr>
+          <p:cNvPr id="5" name="Grafik 4">
+            <a:extLst>
+              <a:ext uri="{FF2B5EF4-FFF2-40B4-BE49-F238E27FC236}">
+                <a16:creationId xmlns:a16="http://schemas.microsoft.com/office/drawing/2014/main" id="{AC980984-39C8-4256-9D0A-4A9DF82415FE}"/>
+              </a:ext>
+            </a:extLst>
+          </p:cNvPr>
+          <p:cNvPicPr>
+            <a:picLocks noChangeAspect="1"/>
+          </p:cNvPicPr>
+          <p:nvPr/>
+        </p:nvPicPr>
+        <p:blipFill>
+          <a:blip r:embed="rId2" cstate="print">
+            <a:extLst>
+              <a:ext uri="{28A0092B-C50C-407E-A947-70E740481C1C}">
+                <a14:useLocalDpi xmlns:a14="http://schemas.microsoft.com/office/drawing/2010/main" val="0"/>
+              </a:ext>
+            </a:extLst>
+          </a:blip>
+          <a:stretch>
+            <a:fillRect/>
+          </a:stretch>
+        </p:blipFill>
+        <p:spPr>
+          <a:xfrm>
+            <a:off x="8471877" y="469204"/>
+            <a:ext cx="3110523" cy="625215"/>
+          </a:xfrm>
+          <a:prstGeom prst="rect">
+            <a:avLst/>
+          </a:prstGeom>
+        </p:spPr>
+      </p:pic>
+    </p:spTree>
+    <p:extLst>
+      <p:ext uri="{BB962C8B-B14F-4D97-AF65-F5344CB8AC3E}">
+        <p14:creationId xmlns:p14="http://schemas.microsoft.com/office/powerpoint/2010/main" val="2826496482"/>
+      </p:ext>
+    </p:extLst>
+  </p:cSld>
+  <p:clrMapOvr>
+    <a:masterClrMapping/>
+  </p:clrMapOvr>
+</p:sld>
+</file>
+
+<file path=ppt/slides/slide9.xml><?xml version="1.0" encoding="utf-8"?>
+<p:sld xmlns:a="http://schemas.openxmlformats.org/drawingml/2006/main" xmlns:r="http://schemas.openxmlformats.org/officeDocument/2006/relationships" xmlns:p="http://schemas.openxmlformats.org/presentationml/2006/main">
+  <p:cSld>
+    <p:spTree>
+      <p:nvGrpSpPr>
+        <p:cNvPr id="1" name=""/>
+        <p:cNvGrpSpPr/>
+        <p:nvPr/>
+      </p:nvGrpSpPr>
+      <p:grpSpPr>
+        <a:xfrm>
+          <a:off x="0" y="0"/>
+          <a:ext cx="0" cy="0"/>
+          <a:chOff x="0" y="0"/>
+          <a:chExt cx="0" cy="0"/>
+        </a:xfrm>
+      </p:grpSpPr>
+      <p:sp>
+        <p:nvSpPr>
+          <p:cNvPr id="2" name="Titel 1">
+            <a:extLst>
+              <a:ext uri="{FF2B5EF4-FFF2-40B4-BE49-F238E27FC236}">
+                <a16:creationId xmlns:a16="http://schemas.microsoft.com/office/drawing/2014/main" id="{84400D62-C043-4C42-A8E3-56B058ADCCEE}"/>
+              </a:ext>
+            </a:extLst>
+          </p:cNvPr>
+          <p:cNvSpPr>
+            <a:spLocks noGrp="1"/>
+          </p:cNvSpPr>
+          <p:nvPr>
+            <p:ph type="title"/>
+          </p:nvPr>
+        </p:nvSpPr>
+        <p:spPr/>
+        <p:txBody>
+          <a:bodyPr/>
+          <a:lstStyle/>
+          <a:p>
+            <a:r>
+              <a:rPr lang="de-DE" dirty="0"/>
+              <a:t>Ausblick</a:t>
+            </a:r>
+          </a:p>
+        </p:txBody>
+      </p:sp>
+      <p:sp>
+        <p:nvSpPr>
+          <p:cNvPr id="3" name="Inhaltsplatzhalter 2">
+            <a:extLst>
+              <a:ext uri="{FF2B5EF4-FFF2-40B4-BE49-F238E27FC236}">
+                <a16:creationId xmlns:a16="http://schemas.microsoft.com/office/drawing/2014/main" id="{08413965-6249-42D1-85DE-46E255F5123F}"/>
+              </a:ext>
+            </a:extLst>
+          </p:cNvPr>
+          <p:cNvSpPr>
+            <a:spLocks noGrp="1"/>
+          </p:cNvSpPr>
+          <p:nvPr>
+            <p:ph idx="1"/>
+          </p:nvPr>
+        </p:nvSpPr>
+        <p:spPr/>
+        <p:txBody>
+          <a:bodyPr/>
+          <a:lstStyle/>
+          <a:p>
+            <a:r>
+              <a:rPr lang="de-DE" dirty="0"/>
+              <a:t>Weiterführende Entwicklung</a:t>
+            </a:r>
+          </a:p>
+        </p:txBody>
+      </p:sp>
+      <p:pic>
+        <p:nvPicPr>
+          <p:cNvPr id="4" name="Grafik 3">
+            <a:extLst>
+              <a:ext uri="{FF2B5EF4-FFF2-40B4-BE49-F238E27FC236}">
+                <a16:creationId xmlns:a16="http://schemas.microsoft.com/office/drawing/2014/main" id="{1F426D8F-4256-407E-88F6-A35387EAEB64}"/>
+              </a:ext>
+            </a:extLst>
+          </p:cNvPr>
+          <p:cNvPicPr>
+            <a:picLocks noChangeAspect="1"/>
+          </p:cNvPicPr>
+          <p:nvPr/>
+        </p:nvPicPr>
+        <p:blipFill>
+          <a:blip r:embed="rId2" cstate="print">
+            <a:extLst>
+              <a:ext uri="{28A0092B-C50C-407E-A947-70E740481C1C}">
+                <a14:useLocalDpi xmlns:a14="http://schemas.microsoft.com/office/drawing/2010/main" val="0"/>
+              </a:ext>
+            </a:extLst>
+          </a:blip>
+          <a:stretch>
+            <a:fillRect/>
+          </a:stretch>
+        </p:blipFill>
+        <p:spPr>
+          <a:xfrm>
+            <a:off x="8471877" y="469204"/>
+            <a:ext cx="3110523" cy="625215"/>
+          </a:xfrm>
+          <a:prstGeom prst="rect">
+            <a:avLst/>
+          </a:prstGeom>
+        </p:spPr>
+      </p:pic>
+    </p:spTree>
+    <p:extLst>
+      <p:ext uri="{BB962C8B-B14F-4D97-AF65-F5344CB8AC3E}">
+        <p14:creationId xmlns:p14="http://schemas.microsoft.com/office/powerpoint/2010/main" val="794121934"/>
+      </p:ext>
+    </p:extLst>
+  </p:cSld>
+  <p:clrMapOvr>
+    <a:masterClrMapping/>
+  </p:clrMapOvr>
+</p:sld>
+</file>
+
 <file path=ppt/theme/theme1.xml><?xml version="1.0" encoding="utf-8"?>
-<a:theme xmlns:a="http://schemas.openxmlformats.org/drawingml/2006/main" name="OldSchool">
+<a:theme xmlns:a="http://schemas.openxmlformats.org/drawingml/2006/main" name="Design1">
   <a:themeElements>
     <a:clrScheme name="Modul">
       <a:dk1>
@@ -4263,7 +5365,7 @@
   <a:extraClrSchemeLst/>
   <a:extLst>
     <a:ext uri="{05A4C25C-085E-4340-85A3-A5531E510DB2}">
-      <thm15:themeFamily xmlns:thm15="http://schemas.microsoft.com/office/thememl/2012/main" name="OldSchool" id="{CB1EED31-7E47-49F9-A8C0-4D84477595C9}" vid="{4E21E79B-086D-42ED-9176-414138C4D6B2}"/>
+      <thm15:themeFamily xmlns:thm15="http://schemas.microsoft.com/office/thememl/2012/main" name="Design1" id="{F2362A2E-0170-48AB-A537-006CE4CF1E30}" vid="{810E9866-CA12-45C8-ADFB-68C288FA6847}"/>
     </a:ext>
   </a:extLst>
 </a:theme>

</xml_diff>

<commit_message>
Add important infos for title page
</commit_message>
<xml_diff>
--- a/docs/verteidigung/Verteidigung.pptx
+++ b/docs/verteidigung/Verteidigung.pptx
@@ -3916,14 +3916,119 @@
         </p:blipFill>
         <p:spPr>
           <a:xfrm>
-            <a:off x="5970951" y="625215"/>
-            <a:ext cx="3110523" cy="625215"/>
+            <a:off x="6299200" y="5506722"/>
+            <a:ext cx="5373136" cy="1080000"/>
           </a:xfrm>
           <a:prstGeom prst="rect">
             <a:avLst/>
           </a:prstGeom>
         </p:spPr>
       </p:pic>
+      <p:sp>
+        <p:nvSpPr>
+          <p:cNvPr id="4" name="Textfeld 3">
+            <a:extLst>
+              <a:ext uri="{FF2B5EF4-FFF2-40B4-BE49-F238E27FC236}">
+                <a16:creationId xmlns:a16="http://schemas.microsoft.com/office/drawing/2014/main" id="{04580F7B-46FC-4E8C-9E7E-5E8FBD74D6A7}"/>
+              </a:ext>
+            </a:extLst>
+          </p:cNvPr>
+          <p:cNvSpPr txBox="1"/>
+          <p:nvPr/>
+        </p:nvSpPr>
+        <p:spPr>
+          <a:xfrm>
+            <a:off x="914400" y="5862056"/>
+            <a:ext cx="2899508" cy="369332"/>
+          </a:xfrm>
+          <a:prstGeom prst="rect">
+            <a:avLst/>
+          </a:prstGeom>
+          <a:noFill/>
+        </p:spPr>
+        <p:txBody>
+          <a:bodyPr wrap="square" rtlCol="0">
+            <a:spAutoFit/>
+          </a:bodyPr>
+          <a:lstStyle/>
+          <a:p>
+            <a:r>
+              <a:rPr lang="de-DE" dirty="0"/>
+              <a:t>Dresden, 30.01.2018</a:t>
+            </a:r>
+          </a:p>
+        </p:txBody>
+      </p:sp>
+      <p:sp>
+        <p:nvSpPr>
+          <p:cNvPr id="5" name="Textfeld 4">
+            <a:extLst>
+              <a:ext uri="{FF2B5EF4-FFF2-40B4-BE49-F238E27FC236}">
+                <a16:creationId xmlns:a16="http://schemas.microsoft.com/office/drawing/2014/main" id="{B84D5BA2-A8F8-49F3-9282-58684A669D95}"/>
+              </a:ext>
+            </a:extLst>
+          </p:cNvPr>
+          <p:cNvSpPr txBox="1"/>
+          <p:nvPr/>
+        </p:nvSpPr>
+        <p:spPr>
+          <a:xfrm>
+            <a:off x="1781908" y="1398217"/>
+            <a:ext cx="4204677" cy="369332"/>
+          </a:xfrm>
+          <a:prstGeom prst="rect">
+            <a:avLst/>
+          </a:prstGeom>
+          <a:noFill/>
+        </p:spPr>
+        <p:txBody>
+          <a:bodyPr wrap="square" rtlCol="0">
+            <a:spAutoFit/>
+          </a:bodyPr>
+          <a:lstStyle/>
+          <a:p>
+            <a:r>
+              <a:rPr lang="de-DE" dirty="0"/>
+              <a:t>Verteidigung der Bachelorarbeit</a:t>
+            </a:r>
+          </a:p>
+        </p:txBody>
+      </p:sp>
+      <p:sp>
+        <p:nvSpPr>
+          <p:cNvPr id="6" name="Textfeld 5">
+            <a:extLst>
+              <a:ext uri="{FF2B5EF4-FFF2-40B4-BE49-F238E27FC236}">
+                <a16:creationId xmlns:a16="http://schemas.microsoft.com/office/drawing/2014/main" id="{ADE0D343-2319-4AAA-BBCC-3DEA7FAC8CD4}"/>
+              </a:ext>
+            </a:extLst>
+          </p:cNvPr>
+          <p:cNvSpPr txBox="1"/>
+          <p:nvPr/>
+        </p:nvSpPr>
+        <p:spPr>
+          <a:xfrm>
+            <a:off x="2756624" y="6231388"/>
+            <a:ext cx="3339376" cy="369332"/>
+          </a:xfrm>
+          <a:prstGeom prst="rect">
+            <a:avLst/>
+          </a:prstGeom>
+          <a:noFill/>
+        </p:spPr>
+        <p:txBody>
+          <a:bodyPr wrap="none" rtlCol="0">
+            <a:spAutoFit/>
+          </a:bodyPr>
+          <a:lstStyle/>
+          <a:p>
+            <a:r>
+              <a:rPr lang="de-DE" dirty="0"/>
+              <a:t>Fakultät Informatik/Mathematik</a:t>
+            </a:r>
+          </a:p>
+        </p:txBody>
+      </p:sp>
     </p:spTree>
     <p:extLst>
       <p:ext uri="{BB962C8B-B14F-4D97-AF65-F5344CB8AC3E}">
@@ -4665,7 +4770,7 @@
           <a:bodyPr/>
           <a:lstStyle/>
           <a:p>
-            <a:endParaRPr lang="de-DE"/>
+            <a:endParaRPr lang="de-DE" dirty="0"/>
           </a:p>
         </p:txBody>
       </p:sp>

</xml_diff>